<commit_message>
Push senza il file docker gigante
</commit_message>
<xml_diff>
--- a/SICUREZZA INFORMATICA E INTERNET/MATERIALE CORSO/01_programma.pptx
+++ b/SICUREZZA INFORMATICA E INTERNET/MATERIALE CORSO/01_programma.pptx
@@ -26,7 +26,7 @@
     <p:sldId id="768" r:id="rId14"/>
     <p:sldId id="771" r:id="rId15"/>
     <p:sldId id="633" r:id="rId16"/>
-    <p:sldId id="720" r:id="rId17"/>
+    <p:sldId id="777" r:id="rId17"/>
   </p:sldIdLst>
   <p:sldSz cx="9144000" cy="6858000" type="screen4x3"/>
   <p:notesSz cx="7099300" cy="10234613"/>
@@ -875,99 +875,6 @@
             <a:extLst>
               <a:ext uri="{FF2B5EF4-FFF2-40B4-BE49-F238E27FC236}">
                 <a16:creationId xmlns:a16="http://schemas.microsoft.com/office/drawing/2014/main" id="{E2AAEAE8-BEEC-4244-BFCB-6F96B69C538C}"/>
-              </a:ext>
-            </a:extLst>
-          </p:cNvPr>
-          <p:cNvSpPr>
-            <a:spLocks noGrp="1"/>
-          </p:cNvSpPr>
-          <p:nvPr>
-            <p:ph type="body" idx="1"/>
-          </p:nvPr>
-        </p:nvSpPr>
-        <p:spPr>
-          <a:noFill/>
-          <a:ln/>
-          <a:extLst>
-            <a:ext uri="{909E8E84-426E-40DD-AFC4-6F175D3DCCD1}">
-              <a14:hiddenFill xmlns:a14="http://schemas.microsoft.com/office/drawing/2010/main">
-                <a:solidFill>
-                  <a:srgbClr val="FFFFFF"/>
-                </a:solidFill>
-              </a14:hiddenFill>
-            </a:ext>
-            <a:ext uri="{91240B29-F687-4F45-9708-019B960494DF}">
-              <a14:hiddenLine xmlns:a14="http://schemas.microsoft.com/office/drawing/2010/main" w="9525">
-                <a:solidFill>
-                  <a:srgbClr val="000000"/>
-                </a:solidFill>
-                <a:miter lim="800000"/>
-                <a:headEnd/>
-                <a:tailEnd/>
-              </a14:hiddenLine>
-            </a:ext>
-          </a:extLst>
-        </p:spPr>
-        <p:txBody>
-          <a:bodyPr/>
-          <a:lstStyle/>
-          <a:p>
-            <a:pPr eaLnBrk="1" hangingPunct="1"/>
-            <a:endParaRPr lang="it-IT" altLang="it-IT"/>
-          </a:p>
-        </p:txBody>
-      </p:sp>
-    </p:spTree>
-  </p:cSld>
-  <p:clrMapOvr>
-    <a:masterClrMapping/>
-  </p:clrMapOvr>
-</p:notes>
-</file>
-
-<file path=ppt/notesSlides/notesSlide4.xml><?xml version="1.0" encoding="utf-8"?>
-<p:notes xmlns:a="http://schemas.openxmlformats.org/drawingml/2006/main" xmlns:r="http://schemas.openxmlformats.org/officeDocument/2006/relationships" xmlns:p="http://schemas.openxmlformats.org/presentationml/2006/main">
-  <p:cSld>
-    <p:spTree>
-      <p:nvGrpSpPr>
-        <p:cNvPr id="1" name=""/>
-        <p:cNvGrpSpPr/>
-        <p:nvPr/>
-      </p:nvGrpSpPr>
-      <p:grpSpPr>
-        <a:xfrm>
-          <a:off x="0" y="0"/>
-          <a:ext cx="0" cy="0"/>
-          <a:chOff x="0" y="0"/>
-          <a:chExt cx="0" cy="0"/>
-        </a:xfrm>
-      </p:grpSpPr>
-      <p:sp>
-        <p:nvSpPr>
-          <p:cNvPr id="18434" name="Segnaposto immagine diapositiva 1">
-            <a:extLst>
-              <a:ext uri="{FF2B5EF4-FFF2-40B4-BE49-F238E27FC236}">
-                <a16:creationId xmlns:a16="http://schemas.microsoft.com/office/drawing/2014/main" id="{38CF13FB-52A9-40F6-AFC5-9058C3965F38}"/>
-              </a:ext>
-            </a:extLst>
-          </p:cNvPr>
-          <p:cNvSpPr>
-            <a:spLocks noGrp="1" noRot="1" noChangeAspect="1" noChangeArrowheads="1" noTextEdit="1"/>
-          </p:cNvSpPr>
-          <p:nvPr>
-            <p:ph type="sldImg"/>
-          </p:nvPr>
-        </p:nvSpPr>
-        <p:spPr>
-          <a:ln/>
-        </p:spPr>
-      </p:sp>
-      <p:sp>
-        <p:nvSpPr>
-          <p:cNvPr id="18435" name="Segnaposto note 2">
-            <a:extLst>
-              <a:ext uri="{FF2B5EF4-FFF2-40B4-BE49-F238E27FC236}">
-                <a16:creationId xmlns:a16="http://schemas.microsoft.com/office/drawing/2014/main" id="{A2847356-7784-4BAF-87F8-2488B58E081C}"/>
               </a:ext>
             </a:extLst>
           </p:cNvPr>
@@ -3676,7 +3583,7 @@
               <a:rPr lang="en-US" sz="1600" b="0" dirty="0">
                 <a:latin typeface="Comic Sans MS" pitchFamily="66" charset="0"/>
               </a:rPr>
-              <a:t>BIANCHI-8039933-COMPUTER_AND_NETWORK_SECURITY_2</a:t>
+              <a:t>BIANCHI-8039933-COMPUTER_AND_NETWORK_SECURITY_3</a:t>
             </a:r>
             <a:br>
               <a:rPr lang="it-IT" sz="2400" b="0" dirty="0">
@@ -3754,8 +3661,8 @@
           <a:p>
             <a:pPr eaLnBrk="1" hangingPunct="1"/>
             <a:r>
-              <a:rPr lang="it-IT" altLang="it-IT" sz="1400" i="1" dirty="0"/>
-              <a:t>2022</a:t>
+              <a:rPr lang="it-IT" altLang="it-IT" sz="1400" i="1"/>
+              <a:t>2025</a:t>
             </a:r>
             <a:endParaRPr lang="it-IT" altLang="it-IT" sz="2000" dirty="0"/>
           </a:p>
@@ -4107,28 +4014,44 @@
           <a:lstStyle/>
           <a:p>
             <a:r>
-              <a:rPr lang="it-IT" altLang="it-IT"/>
-              <a:t>Extras (if time permits)</a:t>
+              <a:rPr lang="it-IT" altLang="it-IT" dirty="0"/>
+              <a:t>Extras (</a:t>
+            </a:r>
+            <a:r>
+              <a:rPr lang="it-IT" altLang="it-IT" dirty="0" err="1"/>
+              <a:t>if</a:t>
+            </a:r>
+            <a:r>
+              <a:rPr lang="it-IT" altLang="it-IT" dirty="0"/>
+              <a:t> time </a:t>
+            </a:r>
+            <a:r>
+              <a:rPr lang="it-IT" altLang="it-IT" dirty="0" err="1"/>
+              <a:t>permits</a:t>
+            </a:r>
+            <a:r>
+              <a:rPr lang="it-IT" altLang="it-IT" dirty="0"/>
+              <a:t>)</a:t>
             </a:r>
           </a:p>
           <a:p>
             <a:pPr lvl="1"/>
             <a:r>
-              <a:rPr lang="en-US" altLang="it-IT"/>
+              <a:rPr lang="en-US" altLang="it-IT" dirty="0"/>
               <a:t>TESLA, Merkel Trees and their applications, Blockchain basics, selected security topics in storage, wireless, etc. </a:t>
             </a:r>
           </a:p>
           <a:p>
             <a:pPr lvl="1"/>
             <a:r>
-              <a:rPr lang="en-US" altLang="it-IT">
+              <a:rPr lang="en-US" altLang="it-IT" dirty="0">
                 <a:solidFill>
                   <a:srgbClr val="FF0000"/>
                 </a:solidFill>
               </a:rPr>
               <a:t>Further topics may be optionally addressed in dedicated talks by invited experts, depending on the year</a:t>
             </a:r>
-            <a:endParaRPr lang="it-IT" altLang="it-IT">
+            <a:endParaRPr lang="it-IT" altLang="it-IT" dirty="0">
               <a:solidFill>
                 <a:srgbClr val="FF0000"/>
               </a:solidFill>
@@ -4325,42 +4248,104 @@
             <p:ph idx="1"/>
           </p:nvPr>
         </p:nvSpPr>
-        <p:spPr/>
+        <p:spPr>
+          <a:xfrm>
+            <a:off x="685800" y="1981200"/>
+            <a:ext cx="8134672" cy="4114800"/>
+          </a:xfrm>
+        </p:spPr>
         <p:txBody>
           <a:bodyPr/>
           <a:lstStyle/>
           <a:p>
-            <a:r>
-              <a:rPr lang="it-IT" altLang="it-IT"/>
-              <a:t>Last year:</a:t>
-            </a:r>
-          </a:p>
-          <a:p>
             <a:pPr lvl="1"/>
             <a:r>
-              <a:rPr lang="it-IT" altLang="it-IT"/>
-              <a:t>3 written midterm</a:t>
-            </a:r>
+              <a:rPr lang="it-IT" altLang="it-IT" dirty="0" err="1"/>
+              <a:t>written</a:t>
+            </a:r>
+            <a:r>
+              <a:rPr lang="it-IT" altLang="it-IT" dirty="0"/>
+              <a:t> </a:t>
+            </a:r>
+            <a:r>
+              <a:rPr lang="it-IT" altLang="it-IT" dirty="0" err="1"/>
+              <a:t>midterms</a:t>
+            </a:r>
+            <a:r>
+              <a:rPr lang="it-IT" altLang="it-IT" dirty="0"/>
+              <a:t> (2 or 3)</a:t>
+            </a:r>
+          </a:p>
+          <a:p>
+            <a:pPr lvl="2"/>
+            <a:r>
+              <a:rPr lang="it-IT" altLang="it-IT" dirty="0" err="1"/>
+              <a:t>Possibility</a:t>
+            </a:r>
+            <a:r>
+              <a:rPr lang="it-IT" altLang="it-IT" dirty="0"/>
+              <a:t> of extra points </a:t>
+            </a:r>
+            <a:r>
+              <a:rPr lang="it-IT" altLang="it-IT" dirty="0" err="1"/>
+              <a:t>during</a:t>
+            </a:r>
+            <a:r>
+              <a:rPr lang="it-IT" altLang="it-IT" dirty="0"/>
+              <a:t> the </a:t>
+            </a:r>
+            <a:r>
+              <a:rPr lang="it-IT" altLang="it-IT" dirty="0" err="1"/>
+              <a:t>course</a:t>
+            </a:r>
+            <a:r>
+              <a:rPr lang="it-IT" altLang="it-IT" dirty="0"/>
+              <a:t> of the class (challenges, </a:t>
+            </a:r>
+            <a:r>
+              <a:rPr lang="it-IT" altLang="it-IT" dirty="0" err="1"/>
+              <a:t>etc</a:t>
+            </a:r>
+            <a:r>
+              <a:rPr lang="it-IT" altLang="it-IT" dirty="0"/>
+              <a:t>)</a:t>
+            </a:r>
+          </a:p>
+          <a:p>
+            <a:pPr lvl="2"/>
+            <a:endParaRPr lang="it-IT" altLang="it-IT" dirty="0"/>
           </a:p>
           <a:p>
             <a:pPr lvl="1"/>
             <a:r>
-              <a:rPr lang="it-IT" altLang="it-IT"/>
-              <a:t>Oral (or mixed written-oral) for all others</a:t>
-            </a:r>
-          </a:p>
-          <a:p>
-            <a:r>
-              <a:rPr lang="it-IT" altLang="it-IT"/>
-              <a:t>This year:</a:t>
-            </a:r>
-          </a:p>
-          <a:p>
-            <a:pPr lvl="1"/>
-            <a:r>
-              <a:rPr lang="it-IT" altLang="it-IT"/>
-              <a:t>Same, though we may reduce to two midterm…</a:t>
-            </a:r>
+              <a:rPr lang="it-IT" altLang="it-IT" dirty="0" err="1"/>
+              <a:t>Oral</a:t>
+            </a:r>
+            <a:r>
+              <a:rPr lang="it-IT" altLang="it-IT" dirty="0"/>
+              <a:t> (or mixed </a:t>
+            </a:r>
+            <a:r>
+              <a:rPr lang="it-IT" altLang="it-IT" dirty="0" err="1"/>
+              <a:t>written-oral</a:t>
+            </a:r>
+            <a:r>
+              <a:rPr lang="it-IT" altLang="it-IT" dirty="0"/>
+              <a:t>) for </a:t>
+            </a:r>
+            <a:r>
+              <a:rPr lang="it-IT" altLang="it-IT" dirty="0" err="1"/>
+              <a:t>all</a:t>
+            </a:r>
+            <a:r>
+              <a:rPr lang="it-IT" altLang="it-IT" dirty="0"/>
+              <a:t> </a:t>
+            </a:r>
+            <a:r>
+              <a:rPr lang="it-IT" altLang="it-IT" dirty="0" err="1"/>
+              <a:t>others</a:t>
+            </a:r>
+            <a:endParaRPr lang="it-IT" altLang="it-IT" dirty="0"/>
           </a:p>
         </p:txBody>
       </p:sp>
@@ -4952,15 +4937,15 @@
       </p:grpSpPr>
       <p:sp>
         <p:nvSpPr>
-          <p:cNvPr id="673794" name="Rectangle 2">
+          <p:cNvPr id="2" name="Titolo 1">
             <a:extLst>
               <a:ext uri="{FF2B5EF4-FFF2-40B4-BE49-F238E27FC236}">
-                <a16:creationId xmlns:a16="http://schemas.microsoft.com/office/drawing/2014/main" id="{D33C3D17-32B8-4937-9F32-2FC0E32E68FA}"/>
+                <a16:creationId xmlns:a16="http://schemas.microsoft.com/office/drawing/2014/main" id="{95E1D553-BA78-C211-C040-E2815C7E34C0}"/>
               </a:ext>
             </a:extLst>
           </p:cNvPr>
           <p:cNvSpPr>
-            <a:spLocks noGrp="1" noChangeArrowheads="1"/>
+            <a:spLocks noGrp="1"/>
           </p:cNvSpPr>
           <p:nvPr>
             <p:ph type="title"/>
@@ -4971,30 +4956,27 @@
           <a:bodyPr/>
           <a:lstStyle/>
           <a:p>
-            <a:pPr eaLnBrk="1" hangingPunct="1">
-              <a:defRPr/>
-            </a:pPr>
             <a:r>
               <a:rPr lang="it-IT" dirty="0"/>
-              <a:t>Mailing list</a:t>
+              <a:t>Communications</a:t>
             </a:r>
           </a:p>
         </p:txBody>
       </p:sp>
       <p:sp>
         <p:nvSpPr>
-          <p:cNvPr id="17411" name="Rectangle 3">
+          <p:cNvPr id="3" name="Segnaposto contenuto 2">
             <a:extLst>
               <a:ext uri="{FF2B5EF4-FFF2-40B4-BE49-F238E27FC236}">
-                <a16:creationId xmlns:a16="http://schemas.microsoft.com/office/drawing/2014/main" id="{0B54F151-A3CF-4667-957D-DB66694348D5}"/>
+                <a16:creationId xmlns:a16="http://schemas.microsoft.com/office/drawing/2014/main" id="{79969816-3D62-8387-A1FF-45C9BAC8166F}"/>
               </a:ext>
             </a:extLst>
           </p:cNvPr>
           <p:cNvSpPr>
-            <a:spLocks noGrp="1" noChangeArrowheads="1"/>
+            <a:spLocks noGrp="1"/>
           </p:cNvSpPr>
           <p:nvPr>
-            <p:ph type="body" idx="1"/>
+            <p:ph idx="1"/>
           </p:nvPr>
         </p:nvSpPr>
         <p:spPr/>
@@ -5002,146 +4984,88 @@
           <a:bodyPr/>
           <a:lstStyle/>
           <a:p>
-            <a:pPr lvl="1" eaLnBrk="1" hangingPunct="1"/>
-            <a:r>
-              <a:rPr lang="it-IT" altLang="it-IT" sz="2800" dirty="0">
-                <a:hlinkClick r:id="rId3"/>
+            <a:r>
+              <a:rPr lang="it-IT" dirty="0" err="1"/>
+              <a:t>Register</a:t>
+            </a:r>
+            <a:r>
+              <a:rPr lang="it-IT" dirty="0"/>
+              <a:t> to the team!</a:t>
+            </a:r>
+          </a:p>
+          <a:p>
+            <a:pPr marL="0" indent="0">
+              <a:buNone/>
+            </a:pPr>
+            <a:endParaRPr lang="en-US" sz="2000" b="0" i="0" dirty="0">
+              <a:solidFill>
+                <a:srgbClr val="005B5B"/>
+              </a:solidFill>
+              <a:effectLst/>
+              <a:latin typeface="Trebuchet MS" panose="020B0603020202020204" pitchFamily="34" charset="0"/>
+            </a:endParaRPr>
+          </a:p>
+          <a:p>
+            <a:pPr marL="0" indent="0">
+              <a:buNone/>
+            </a:pPr>
+            <a:endParaRPr lang="en-US" sz="2000" b="0" dirty="0">
+              <a:solidFill>
+                <a:srgbClr val="005B5B"/>
+              </a:solidFill>
+              <a:latin typeface="Trebuchet MS" panose="020B0603020202020204" pitchFamily="34" charset="0"/>
+            </a:endParaRPr>
+          </a:p>
+          <a:p>
+            <a:pPr marL="0" indent="0">
+              <a:buNone/>
+            </a:pPr>
+            <a:r>
+              <a:rPr lang="en-US" sz="2000" b="0" i="0" dirty="0">
+                <a:solidFill>
+                  <a:srgbClr val="005B5B"/>
+                </a:solidFill>
+                <a:effectLst/>
+                <a:latin typeface="Trebuchet MS" panose="020B0603020202020204" pitchFamily="34" charset="0"/>
               </a:rPr>
-              <a:t>iss@lists.uniroma2.it</a:t>
-            </a:r>
-            <a:endParaRPr lang="it-IT" altLang="it-IT" sz="2800" dirty="0"/>
-          </a:p>
-          <a:p>
-            <a:pPr lvl="1" eaLnBrk="1" hangingPunct="1"/>
-            <a:r>
-              <a:rPr lang="it-IT" altLang="it-IT" sz="2800" dirty="0" err="1"/>
-              <a:t>Register</a:t>
-            </a:r>
-            <a:r>
-              <a:rPr lang="it-IT" altLang="it-IT" sz="2800" dirty="0"/>
-              <a:t> </a:t>
-            </a:r>
-            <a:r>
-              <a:rPr lang="it-IT" altLang="it-IT" sz="2800" dirty="0" err="1"/>
-              <a:t>at</a:t>
-            </a:r>
-            <a:r>
-              <a:rPr lang="it-IT" altLang="it-IT" sz="2800" dirty="0"/>
-              <a:t>:</a:t>
-            </a:r>
-          </a:p>
-          <a:p>
-            <a:pPr lvl="1" eaLnBrk="1" hangingPunct="1"/>
-            <a:r>
-              <a:rPr lang="it-IT" altLang="it-IT" sz="2800" dirty="0">
-                <a:hlinkClick r:id="rId4"/>
+              <a:t>BIANCHI-8039933-COMPUTER_AND_NETWORK_SECURITY_3</a:t>
+            </a:r>
+          </a:p>
+          <a:p>
+            <a:pPr marL="0" indent="0">
+              <a:buNone/>
+            </a:pPr>
+            <a:endParaRPr lang="en-US" sz="2000" b="0" dirty="0">
+              <a:solidFill>
+                <a:srgbClr val="005B5B"/>
+              </a:solidFill>
+              <a:latin typeface="Trebuchet MS" panose="020B0603020202020204" pitchFamily="34" charset="0"/>
+            </a:endParaRPr>
+          </a:p>
+          <a:p>
+            <a:pPr marL="0" indent="0">
+              <a:buNone/>
+            </a:pPr>
+            <a:r>
+              <a:rPr lang="it-IT" sz="5400" b="1" i="0" dirty="0">
+                <a:solidFill>
+                  <a:srgbClr val="242424"/>
+                </a:solidFill>
+                <a:effectLst/>
+                <a:latin typeface="-apple-system"/>
               </a:rPr>
-              <a:t>https://lists.uniroma2.it/index.html/info/iss</a:t>
-            </a:r>
-            <a:endParaRPr lang="it-IT" altLang="it-IT" sz="2800" dirty="0"/>
-          </a:p>
-          <a:p>
-            <a:pPr lvl="1" eaLnBrk="1" hangingPunct="1"/>
-            <a:endParaRPr lang="it-IT" altLang="it-IT" sz="2800" dirty="0"/>
-          </a:p>
-          <a:p>
-            <a:pPr lvl="1" eaLnBrk="1" hangingPunct="1"/>
-            <a:r>
-              <a:rPr lang="it-IT" altLang="it-IT" sz="2800" dirty="0">
-                <a:solidFill>
-                  <a:srgbClr val="FF0000"/>
-                </a:solidFill>
-              </a:rPr>
-              <a:t>(</a:t>
-            </a:r>
-            <a:r>
-              <a:rPr lang="it-IT" altLang="it-IT" sz="2800" dirty="0" err="1">
-                <a:solidFill>
-                  <a:srgbClr val="FF0000"/>
-                </a:solidFill>
-              </a:rPr>
-              <a:t>though</a:t>
-            </a:r>
-            <a:r>
-              <a:rPr lang="it-IT" altLang="it-IT" sz="2800" dirty="0">
-                <a:solidFill>
-                  <a:srgbClr val="FF0000"/>
-                </a:solidFill>
-              </a:rPr>
-              <a:t> </a:t>
-            </a:r>
-            <a:r>
-              <a:rPr lang="it-IT" altLang="it-IT" sz="2800" dirty="0" err="1">
-                <a:solidFill>
-                  <a:srgbClr val="FF0000"/>
-                </a:solidFill>
-              </a:rPr>
-              <a:t>I’ll</a:t>
-            </a:r>
-            <a:r>
-              <a:rPr lang="it-IT" altLang="it-IT" sz="2800" dirty="0">
-                <a:solidFill>
-                  <a:srgbClr val="FF0000"/>
-                </a:solidFill>
-              </a:rPr>
-              <a:t> </a:t>
-            </a:r>
-            <a:r>
-              <a:rPr lang="it-IT" altLang="it-IT" sz="2800" dirty="0" err="1">
-                <a:solidFill>
-                  <a:srgbClr val="FF0000"/>
-                </a:solidFill>
-              </a:rPr>
-              <a:t>probably</a:t>
-            </a:r>
-            <a:r>
-              <a:rPr lang="it-IT" altLang="it-IT" sz="2800" dirty="0">
-                <a:solidFill>
-                  <a:srgbClr val="FF0000"/>
-                </a:solidFill>
-              </a:rPr>
-              <a:t> </a:t>
-            </a:r>
-            <a:r>
-              <a:rPr lang="it-IT" altLang="it-IT" sz="2800" dirty="0" err="1">
-                <a:solidFill>
-                  <a:srgbClr val="FF0000"/>
-                </a:solidFill>
-              </a:rPr>
-              <a:t>mainly</a:t>
-            </a:r>
-            <a:r>
-              <a:rPr lang="it-IT" altLang="it-IT" sz="2800" dirty="0">
-                <a:solidFill>
-                  <a:srgbClr val="FF0000"/>
-                </a:solidFill>
-              </a:rPr>
-              <a:t> use teams, so make sure </a:t>
-            </a:r>
-            <a:r>
-              <a:rPr lang="it-IT" altLang="it-IT" sz="2800" dirty="0" err="1">
-                <a:solidFill>
-                  <a:srgbClr val="FF0000"/>
-                </a:solidFill>
-              </a:rPr>
-              <a:t>you</a:t>
-            </a:r>
-            <a:r>
-              <a:rPr lang="it-IT" altLang="it-IT" sz="2800" dirty="0">
-                <a:solidFill>
-                  <a:srgbClr val="FF0000"/>
-                </a:solidFill>
-              </a:rPr>
-              <a:t> are in the team) </a:t>
-            </a:r>
-            <a:br>
-              <a:rPr lang="it-IT" altLang="it-IT" sz="2800" dirty="0"/>
-            </a:br>
-            <a:endParaRPr lang="it-IT" altLang="it-IT" sz="2800" dirty="0"/>
+              <a:t>6ht908a</a:t>
+            </a:r>
+            <a:endParaRPr lang="it-IT" sz="2000" dirty="0"/>
           </a:p>
         </p:txBody>
       </p:sp>
     </p:spTree>
+    <p:extLst>
+      <p:ext uri="{BB962C8B-B14F-4D97-AF65-F5344CB8AC3E}">
+        <p14:creationId xmlns:p14="http://schemas.microsoft.com/office/powerpoint/2010/main" val="392802789"/>
+      </p:ext>
+    </p:extLst>
   </p:cSld>
   <p:clrMapOvr>
     <a:masterClrMapping/>
@@ -5919,7 +5843,7 @@
                   <a:srgbClr val="FF0000"/>
                 </a:solidFill>
               </a:rPr>
-              <a:t>(M. Bonola, A. Pellegrini)</a:t>
+              <a:t>(A. Tulumello, A. Pellegrini)</a:t>
             </a:r>
             <a:endParaRPr kumimoji="0" lang="it-IT" sz="2000" b="0" i="0" u="none" strike="noStrike" cap="none" normalizeH="0" baseline="0" dirty="0">
               <a:ln>
@@ -9498,7 +9422,7 @@
         <p:spPr>
           <a:xfrm>
             <a:off x="685800" y="1700808"/>
-            <a:ext cx="7696200" cy="4608512"/>
+            <a:ext cx="7696200" cy="4248472"/>
           </a:xfrm>
         </p:spPr>
         <p:txBody>
@@ -9512,7 +9436,7 @@
             </a:pPr>
             <a:r>
               <a:rPr lang="en-US" dirty="0"/>
-              <a:t>Basic crypto (≈ 1.5 CFU)</a:t>
+              <a:t>Basic crypto review (≈ 1.5 CFU)</a:t>
             </a:r>
           </a:p>
           <a:p>
@@ -9521,7 +9445,7 @@
             </a:pPr>
             <a:r>
               <a:rPr lang="en-US" dirty="0"/>
-              <a:t>attacks, countermeasures, security services, basic cryptographic constructions (stream ciphers, block ciphers and modes, hash functions, Merkle-</a:t>
+              <a:t>basic cryptographic constructions (stream ciphers, block ciphers and modes, hash functions, Merkle-</a:t>
             </a:r>
             <a:r>
               <a:rPr lang="en-US" dirty="0" err="1"/>
@@ -9563,7 +9487,7 @@
                   <a:srgbClr val="FF0000"/>
                 </a:solidFill>
               </a:rPr>
-              <a:t>Partially overlaps with ICT infrastructure security (but better hear twice than never…)</a:t>
+              <a:t>Partially overlaps with past classes (but better hear twice than never…)</a:t>
             </a:r>
           </a:p>
         </p:txBody>
@@ -10884,9 +10808,9 @@
 </file>
 
 <file path=customXml/item1.xml><?xml version="1.0" encoding="utf-8"?>
-<ct:contentTypeSchema xmlns:ct="http://schemas.microsoft.com/office/2006/metadata/contentType" xmlns:ma="http://schemas.microsoft.com/office/2006/metadata/properties/metaAttributes" ct:_="" ma:_="" ma:contentTypeName="Documento" ma:contentTypeID="0x010100F2781951D3CFA64AA3493CD3E6442C76" ma:contentTypeVersion="4" ma:contentTypeDescription="Creare un nuovo documento." ma:contentTypeScope="" ma:versionID="a36c6b2f7fcd373cb8b64cdfd812e698">
-  <xsd:schema xmlns:xsd="http://www.w3.org/2001/XMLSchema" xmlns:xs="http://www.w3.org/2001/XMLSchema" xmlns:p="http://schemas.microsoft.com/office/2006/metadata/properties" xmlns:ns2="aae43852-53e9-4813-a3db-c50f0e7934bf" targetNamespace="http://schemas.microsoft.com/office/2006/metadata/properties" ma:root="true" ma:fieldsID="b16886be2dba503720a39a8063f8acf3" ns2:_="">
-    <xsd:import namespace="aae43852-53e9-4813-a3db-c50f0e7934bf"/>
+<ct:contentTypeSchema xmlns:ct="http://schemas.microsoft.com/office/2006/metadata/contentType" xmlns:ma="http://schemas.microsoft.com/office/2006/metadata/properties/metaAttributes" ct:_="" ma:_="" ma:contentTypeName="Documento" ma:contentTypeID="0x010100E3E8458D254D7543B8EE0336155E759B" ma:contentTypeVersion="6" ma:contentTypeDescription="Creare un nuovo documento." ma:contentTypeScope="" ma:versionID="e2e49e49a64067dddf0e6e717b5acb75">
+  <xsd:schema xmlns:xsd="http://www.w3.org/2001/XMLSchema" xmlns:xs="http://www.w3.org/2001/XMLSchema" xmlns:p="http://schemas.microsoft.com/office/2006/metadata/properties" xmlns:ns2="2154ac9b-a8e0-4f77-b94d-78f05534efde" targetNamespace="http://schemas.microsoft.com/office/2006/metadata/properties" ma:root="true" ma:fieldsID="90f2ad5abd88b031f011f513786a11c1" ns2:_="">
+    <xsd:import namespace="2154ac9b-a8e0-4f77-b94d-78f05534efde"/>
     <xsd:element name="properties">
       <xsd:complexType>
         <xsd:sequence>
@@ -10897,6 +10821,8 @@
                 <xsd:element ref="ns2:MediaServiceFastMetadata" minOccurs="0"/>
                 <xsd:element ref="ns2:MediaServiceSearchProperties" minOccurs="0"/>
                 <xsd:element ref="ns2:MediaServiceObjectDetectorVersions" minOccurs="0"/>
+                <xsd:element ref="ns2:MediaServiceGenerationTime" minOccurs="0"/>
+                <xsd:element ref="ns2:MediaServiceEventHashCode" minOccurs="0"/>
               </xsd:all>
             </xsd:complexType>
           </xsd:element>
@@ -10904,7 +10830,7 @@
       </xsd:complexType>
     </xsd:element>
   </xsd:schema>
-  <xsd:schema xmlns:xsd="http://www.w3.org/2001/XMLSchema" xmlns:xs="http://www.w3.org/2001/XMLSchema" xmlns:dms="http://schemas.microsoft.com/office/2006/documentManagement/types" xmlns:pc="http://schemas.microsoft.com/office/infopath/2007/PartnerControls" targetNamespace="aae43852-53e9-4813-a3db-c50f0e7934bf" elementFormDefault="qualified">
+  <xsd:schema xmlns:xsd="http://www.w3.org/2001/XMLSchema" xmlns:xs="http://www.w3.org/2001/XMLSchema" xmlns:dms="http://schemas.microsoft.com/office/2006/documentManagement/types" xmlns:pc="http://schemas.microsoft.com/office/infopath/2007/PartnerControls" targetNamespace="2154ac9b-a8e0-4f77-b94d-78f05534efde" elementFormDefault="qualified">
     <xsd:import namespace="http://schemas.microsoft.com/office/2006/documentManagement/types"/>
     <xsd:import namespace="http://schemas.microsoft.com/office/infopath/2007/PartnerControls"/>
     <xsd:element name="MediaServiceMetadata" ma:index="8" nillable="true" ma:displayName="MediaServiceMetadata" ma:hidden="true" ma:internalName="MediaServiceMetadata" ma:readOnly="true">
@@ -10923,6 +10849,16 @@
       </xsd:simpleType>
     </xsd:element>
     <xsd:element name="MediaServiceObjectDetectorVersions" ma:index="11" nillable="true" ma:displayName="MediaServiceObjectDetectorVersions" ma:hidden="true" ma:indexed="true" ma:internalName="MediaServiceObjectDetectorVersions" ma:readOnly="true">
+      <xsd:simpleType>
+        <xsd:restriction base="dms:Text"/>
+      </xsd:simpleType>
+    </xsd:element>
+    <xsd:element name="MediaServiceGenerationTime" ma:index="12" nillable="true" ma:displayName="MediaServiceGenerationTime" ma:hidden="true" ma:internalName="MediaServiceGenerationTime" ma:readOnly="true">
+      <xsd:simpleType>
+        <xsd:restriction base="dms:Text"/>
+      </xsd:simpleType>
+    </xsd:element>
+    <xsd:element name="MediaServiceEventHashCode" ma:index="13" nillable="true" ma:displayName="MediaServiceEventHashCode" ma:hidden="true" ma:internalName="MediaServiceEventHashCode" ma:readOnly="true">
       <xsd:simpleType>
         <xsd:restriction base="dms:Text"/>
       </xsd:simpleType>
@@ -11043,13 +10979,13 @@
 </file>
 
 <file path=customXml/itemProps1.xml><?xml version="1.0" encoding="utf-8"?>
-<ds:datastoreItem xmlns:ds="http://schemas.openxmlformats.org/officeDocument/2006/customXml" ds:itemID="{20EEFF5E-32E4-4AE9-8492-358D9EFA0328}"/>
+<ds:datastoreItem xmlns:ds="http://schemas.openxmlformats.org/officeDocument/2006/customXml" ds:itemID="{318964AF-BC0B-46FF-B971-35C1B03B362E}"/>
 </file>
 
 <file path=customXml/itemProps2.xml><?xml version="1.0" encoding="utf-8"?>
-<ds:datastoreItem xmlns:ds="http://schemas.openxmlformats.org/officeDocument/2006/customXml" ds:itemID="{F2E513C9-CFCC-45CC-8964-8625A0EA7D14}"/>
+<ds:datastoreItem xmlns:ds="http://schemas.openxmlformats.org/officeDocument/2006/customXml" ds:itemID="{2749CA41-BE9E-4401-9C45-960F4EF627FA}"/>
 </file>
 
 <file path=customXml/itemProps3.xml><?xml version="1.0" encoding="utf-8"?>
-<ds:datastoreItem xmlns:ds="http://schemas.openxmlformats.org/officeDocument/2006/customXml" ds:itemID="{4E30968D-B87E-4909-B17A-E739AB448A64}"/>
+<ds:datastoreItem xmlns:ds="http://schemas.openxmlformats.org/officeDocument/2006/customXml" ds:itemID="{4F776D67-5EDF-4D79-A153-EB2ED46EF07C}"/>
 </file>
</xml_diff>